<commit_message>
Update after Monday morning discussion
</commit_message>
<xml_diff>
--- a/mami-oslo/WP4status.pptx
+++ b/mami-oslo/WP4status.pptx
@@ -261,7 +261,7 @@
           <a:p>
             <a:fld id="{38AEA946-BE12-485E-8CED-EB49F79C0D9F}" type="datetimeFigureOut">
               <a:rPr lang="de-CH" smtClean="0"/>
-              <a:t>03.07.17</a:t>
+              <a:t>04.07.17</a:t>
             </a:fld>
             <a:endParaRPr lang="de-CH"/>
           </a:p>
@@ -5898,15 +5898,7 @@
           <a:p>
             <a:r>
               <a:rPr lang="en-GB" dirty="0" smtClean="0"/>
-              <a:t>WP4 as of </a:t>
-            </a:r>
-            <a:r>
-              <a:rPr lang="en-GB" dirty="0" smtClean="0"/>
-              <a:t>July 2017</a:t>
-            </a:r>
-            <a:r>
-              <a:rPr lang="en-GB" dirty="0" smtClean="0"/>
-              <a:t/>
+              <a:t>WP4 as of July 2017</a:t>
             </a:r>
             <a:br>
               <a:rPr lang="en-GB" dirty="0" smtClean="0"/>
@@ -6027,22 +6019,14 @@
           <a:p>
             <a:r>
               <a:rPr lang="en-GB" dirty="0" smtClean="0"/>
-              <a:t>Doing </a:t>
-            </a:r>
+              <a:t>Doing reasonably well </a:t>
+            </a:r>
+          </a:p>
+          <a:p>
+            <a:pPr lvl="1"/>
             <a:r>
               <a:rPr lang="en-GB" dirty="0" smtClean="0"/>
-              <a:t>reasonably well </a:t>
-            </a:r>
-          </a:p>
-          <a:p>
-            <a:pPr lvl="1"/>
-            <a:r>
-              <a:rPr lang="en-GB" dirty="0" smtClean="0"/>
-              <a:t>Deliverables </a:t>
-            </a:r>
-            <a:r>
-              <a:rPr lang="en-GB" dirty="0" smtClean="0"/>
-              <a:t>on time</a:t>
+              <a:t>Deliverables on time</a:t>
             </a:r>
           </a:p>
           <a:p>
@@ -6050,16 +6034,11 @@
             <a:r>
               <a:rPr lang="en-GB" dirty="0" smtClean="0">
                 <a:solidFill>
-                  <a:srgbClr val="FF0000"/>
+                  <a:schemeClr val="tx1"/>
                 </a:solidFill>
               </a:rPr>
               <a:t>The Observatory and FIRE fronts</a:t>
             </a:r>
-            <a:endParaRPr lang="en-GB" dirty="0" smtClean="0">
-              <a:solidFill>
-                <a:srgbClr val="FF0000"/>
-              </a:solidFill>
-            </a:endParaRPr>
           </a:p>
           <a:p>
             <a:r>
@@ -6092,13 +6071,8 @@
             <a:pPr lvl="1"/>
             <a:r>
               <a:rPr lang="en-GB" dirty="0" smtClean="0"/>
-              <a:t>Do we want to collaborate with </a:t>
-            </a:r>
-            <a:r>
-              <a:rPr lang="en-GB" dirty="0" smtClean="0"/>
-              <a:t>IEEE ETIWG</a:t>
-            </a:r>
-            <a:endParaRPr lang="en-GB" dirty="0" smtClean="0"/>
+              <a:t>Do we want to collaborate with IEEE ETIWG</a:t>
+            </a:r>
           </a:p>
           <a:p>
             <a:r>
@@ -6112,7 +6086,6 @@
               <a:rPr lang="en-GB" dirty="0" smtClean="0"/>
               <a:t>Fine, including a joint workshop with MONROE</a:t>
             </a:r>
-            <a:endParaRPr lang="en-GB" dirty="0" smtClean="0"/>
           </a:p>
           <a:p>
             <a:pPr lvl="1"/>
@@ -6120,7 +6093,6 @@
               <a:rPr lang="en-GB" dirty="0" smtClean="0"/>
               <a:t>High-impact targets?</a:t>
             </a:r>
-            <a:endParaRPr lang="en-GB" dirty="0" smtClean="0"/>
           </a:p>
           <a:p>
             <a:r>
@@ -6145,17 +6117,12 @@
               <a:rPr lang="en-GB" dirty="0" smtClean="0"/>
               <a:t>GSMA experiments</a:t>
             </a:r>
-            <a:endParaRPr lang="en-GB" dirty="0" smtClean="0"/>
           </a:p>
           <a:p>
             <a:pPr lvl="1"/>
             <a:r>
               <a:rPr lang="en-GB" dirty="0" smtClean="0"/>
-              <a:t>The </a:t>
-            </a:r>
-            <a:r>
-              <a:rPr lang="en-GB" dirty="0" smtClean="0"/>
-              <a:t>opportunity with security vendors (SYMANTEC)</a:t>
+              <a:t>The opportunity with security vendors (SYMANTEC)</a:t>
             </a:r>
           </a:p>
           <a:p>
@@ -6172,7 +6139,6 @@
               <a:rPr lang="en-GB" dirty="0" smtClean="0"/>
               <a:t>/OSM/OPNFV/…</a:t>
             </a:r>
-            <a:endParaRPr lang="en-GB" dirty="0" smtClean="0"/>
           </a:p>
           <a:p>
             <a:r>
@@ -6186,7 +6152,6 @@
               <a:rPr lang="en-GB" dirty="0" smtClean="0"/>
               <a:t>Metering Observatory accesses and software downloads</a:t>
             </a:r>
-            <a:endParaRPr lang="en-GB" dirty="0" smtClean="0"/>
           </a:p>
         </p:txBody>
       </p:sp>
@@ -6324,13 +6289,17 @@
             </a:r>
             <a:r>
               <a:rPr lang="en-GB" dirty="0" smtClean="0"/>
-              <a:t>. M6</a:t>
+              <a:t>. </a:t>
+            </a:r>
+            <a:r>
+              <a:rPr lang="en-GB" dirty="0" smtClean="0"/>
+              <a:t>M6</a:t>
             </a:r>
           </a:p>
           <a:p>
             <a:pPr>
-              <a:buFont typeface="AppleColorEmoji" charset="0"/>
-              <a:buChar char="❓"/>
+              <a:buFont typeface="Wingdings" charset="2"/>
+              <a:buChar char="ü"/>
             </a:pPr>
             <a:r>
               <a:rPr lang="en-GB" dirty="0" smtClean="0">
@@ -6338,7 +6307,15 @@
                   <a:schemeClr val="tx1"/>
                 </a:solidFill>
               </a:rPr>
-              <a:t>MS4 - </a:t>
+              <a:t>MS4 </a:t>
+            </a:r>
+            <a:r>
+              <a:rPr lang="en-GB" dirty="0" smtClean="0">
+                <a:solidFill>
+                  <a:schemeClr val="tx1"/>
+                </a:solidFill>
+              </a:rPr>
+              <a:t>- </a:t>
             </a:r>
             <a:r>
               <a:rPr lang="en-GB" i="1" dirty="0" smtClean="0">
@@ -6354,29 +6331,21 @@
                   <a:schemeClr val="tx1"/>
                 </a:solidFill>
               </a:rPr>
-              <a:t>. </a:t>
-            </a:r>
+              <a:t>. M12</a:t>
+            </a:r>
+          </a:p>
+          <a:p>
+            <a:pPr lvl="1">
+              <a:buFont typeface="Arial" charset="0"/>
+              <a:buChar char="•"/>
+            </a:pPr>
             <a:r>
               <a:rPr lang="en-GB" dirty="0" smtClean="0">
                 <a:solidFill>
                   <a:schemeClr val="tx1"/>
                 </a:solidFill>
               </a:rPr>
-              <a:t>M12</a:t>
-            </a:r>
-          </a:p>
-          <a:p>
-            <a:pPr lvl="1">
-              <a:buFont typeface="Arial" charset="0"/>
-              <a:buChar char="•"/>
-            </a:pPr>
-            <a:r>
-              <a:rPr lang="en-GB" dirty="0" smtClean="0">
-                <a:solidFill>
-                  <a:schemeClr val="tx1"/>
-                </a:solidFill>
-              </a:rPr>
-              <a:t>Can we declare victory?</a:t>
+              <a:t>Released on March</a:t>
             </a:r>
             <a:endParaRPr lang="en-GB" dirty="0" smtClean="0">
               <a:solidFill>
@@ -6419,15 +6388,7 @@
                   <a:schemeClr val="tx1"/>
                 </a:solidFill>
               </a:rPr>
-              <a:t>. </a:t>
-            </a:r>
-            <a:r>
-              <a:rPr lang="en-GB" dirty="0" smtClean="0">
-                <a:solidFill>
-                  <a:schemeClr val="tx1"/>
-                </a:solidFill>
-              </a:rPr>
-              <a:t>M18</a:t>
+              <a:t>. M18</a:t>
             </a:r>
           </a:p>
           <a:p>
@@ -6443,11 +6404,6 @@
               </a:rPr>
               <a:t>Is enough the recent workshop with MONROE?</a:t>
             </a:r>
-            <a:endParaRPr lang="en-GB" dirty="0" smtClean="0">
-              <a:solidFill>
-                <a:schemeClr val="tx1"/>
-              </a:solidFill>
-            </a:endParaRPr>
           </a:p>
           <a:p>
             <a:pPr>
@@ -6486,20 +6442,23 @@
             </a:r>
             <a:r>
               <a:rPr lang="en-GB" u="sng" dirty="0" smtClean="0"/>
-              <a:t>. </a:t>
-            </a:r>
-            <a:r>
-              <a:rPr lang="en-GB" u="sng" dirty="0" smtClean="0"/>
-              <a:t>M23</a:t>
+              <a:t>. M23</a:t>
             </a:r>
           </a:p>
           <a:p>
             <a:pPr lvl="1"/>
             <a:r>
               <a:rPr lang="en-GB" dirty="0" smtClean="0"/>
-              <a:t>Direct possibilities: The Hague (October), Paris (March), Madrid (May)</a:t>
-            </a:r>
-            <a:endParaRPr lang="en-GB" dirty="0" smtClean="0"/>
+              <a:t>Direct possibilities: The Hague (October), </a:t>
+            </a:r>
+            <a:r>
+              <a:rPr lang="en-GB" dirty="0" smtClean="0"/>
+              <a:t>London (March), Paris </a:t>
+            </a:r>
+            <a:r>
+              <a:rPr lang="en-GB" dirty="0" smtClean="0"/>
+              <a:t>(March), Madrid (May)</a:t>
+            </a:r>
           </a:p>
           <a:p>
             <a:r>
@@ -6638,15 +6597,7 @@
                   <a:schemeClr val="tx1"/>
                 </a:solidFill>
               </a:rPr>
-              <a:t>(</a:t>
-            </a:r>
-            <a:r>
-              <a:rPr lang="en-GB" dirty="0" smtClean="0">
-                <a:solidFill>
-                  <a:schemeClr val="tx1"/>
-                </a:solidFill>
-              </a:rPr>
-              <a:t>I Know, Hic </a:t>
+              <a:t>(I Know, Hic </a:t>
             </a:r>
             <a:r>
               <a:rPr lang="en-GB" dirty="0" err="1" smtClean="0">
@@ -6685,7 +6636,7 @@
         <p:spPr/>
         <p:txBody>
           <a:bodyPr>
-            <a:normAutofit fontScale="77500" lnSpcReduction="20000"/>
+            <a:normAutofit fontScale="62500" lnSpcReduction="20000"/>
           </a:bodyPr>
           <a:lstStyle/>
           <a:p>
@@ -6803,8 +6754,31 @@
           <a:p>
             <a:r>
               <a:rPr lang="en-GB" dirty="0" smtClean="0"/>
-              <a:t>Do we want to collaborate with them?</a:t>
-            </a:r>
+              <a:t>Do we want to collaborate with </a:t>
+            </a:r>
+            <a:r>
+              <a:rPr lang="en-GB" dirty="0" smtClean="0"/>
+              <a:t>them (as a project)?</a:t>
+            </a:r>
+          </a:p>
+          <a:p>
+            <a:pPr lvl="1"/>
+            <a:r>
+              <a:rPr lang="en-GB" dirty="0" err="1" smtClean="0"/>
+              <a:t>Analyze</a:t>
+            </a:r>
+            <a:r>
+              <a:rPr lang="en-GB" dirty="0" smtClean="0"/>
+              <a:t> what they are doing</a:t>
+            </a:r>
+          </a:p>
+          <a:p>
+            <a:pPr lvl="1"/>
+            <a:r>
+              <a:rPr lang="en-GB" dirty="0" smtClean="0"/>
+              <a:t>Report it to our reviewers</a:t>
+            </a:r>
+            <a:endParaRPr lang="en-GB" dirty="0" smtClean="0"/>
           </a:p>
         </p:txBody>
       </p:sp>

</xml_diff>